<commit_message>
add updated L13 with note about public
</commit_message>
<xml_diff>
--- a/Wi21_content/SEDS/L13.Continuous_Integration.pptx
+++ b/Wi21_content/SEDS/L13.Continuous_Integration.pptx
@@ -5,21 +5,23 @@
     <p:sldMasterId id="2147483648" r:id="rId1"/>
   </p:sldMasterIdLst>
   <p:notesMasterIdLst>
-    <p:notesMasterId r:id="rId14"/>
+    <p:notesMasterId r:id="rId16"/>
   </p:notesMasterIdLst>
   <p:sldIdLst>
-    <p:sldId id="316" r:id="rId2"/>
-    <p:sldId id="329" r:id="rId3"/>
-    <p:sldId id="317" r:id="rId4"/>
-    <p:sldId id="320" r:id="rId5"/>
-    <p:sldId id="321" r:id="rId6"/>
-    <p:sldId id="322" r:id="rId7"/>
-    <p:sldId id="318" r:id="rId8"/>
-    <p:sldId id="323" r:id="rId9"/>
-    <p:sldId id="324" r:id="rId10"/>
-    <p:sldId id="319" r:id="rId11"/>
-    <p:sldId id="327" r:id="rId12"/>
-    <p:sldId id="328" r:id="rId13"/>
+    <p:sldId id="330" r:id="rId2"/>
+    <p:sldId id="316" r:id="rId3"/>
+    <p:sldId id="329" r:id="rId4"/>
+    <p:sldId id="317" r:id="rId5"/>
+    <p:sldId id="320" r:id="rId6"/>
+    <p:sldId id="321" r:id="rId7"/>
+    <p:sldId id="322" r:id="rId8"/>
+    <p:sldId id="318" r:id="rId9"/>
+    <p:sldId id="323" r:id="rId10"/>
+    <p:sldId id="324" r:id="rId11"/>
+    <p:sldId id="331" r:id="rId12"/>
+    <p:sldId id="319" r:id="rId13"/>
+    <p:sldId id="327" r:id="rId14"/>
+    <p:sldId id="328" r:id="rId15"/>
   </p:sldIdLst>
   <p:sldSz cx="9144000" cy="6858000" type="screen4x3"/>
   <p:notesSz cx="6858000" cy="9144000"/>
@@ -236,7 +238,7 @@
           <a:p>
             <a:fld id="{08F62E20-B1AA-3442-B8F1-F4A56998389D}" type="datetimeFigureOut">
               <a:rPr lang="en-US" smtClean="0"/>
-              <a:t>2/24/20</a:t>
+              <a:t>2/25/21</a:t>
             </a:fld>
             <a:endParaRPr lang="en-US"/>
           </a:p>
@@ -690,7 +692,7 @@
           <a:p>
             <a:fld id="{2691D6E4-0F7A-0249-86EF-226720E50E4C}" type="datetimeFigureOut">
               <a:rPr lang="en-US" smtClean="0"/>
-              <a:t>2/24/20</a:t>
+              <a:t>2/25/21</a:t>
             </a:fld>
             <a:endParaRPr lang="en-US"/>
           </a:p>
@@ -882,7 +884,7 @@
           <a:p>
             <a:fld id="{2691D6E4-0F7A-0249-86EF-226720E50E4C}" type="datetimeFigureOut">
               <a:rPr lang="en-US" smtClean="0"/>
-              <a:t>2/24/20</a:t>
+              <a:t>2/25/21</a:t>
             </a:fld>
             <a:endParaRPr lang="en-US"/>
           </a:p>
@@ -1084,7 +1086,7 @@
           <a:p>
             <a:fld id="{2691D6E4-0F7A-0249-86EF-226720E50E4C}" type="datetimeFigureOut">
               <a:rPr lang="en-US" smtClean="0"/>
-              <a:t>2/24/20</a:t>
+              <a:t>2/25/21</a:t>
             </a:fld>
             <a:endParaRPr lang="en-US"/>
           </a:p>
@@ -1276,7 +1278,7 @@
           <a:p>
             <a:fld id="{2691D6E4-0F7A-0249-86EF-226720E50E4C}" type="datetimeFigureOut">
               <a:rPr lang="en-US" smtClean="0"/>
-              <a:t>2/24/20</a:t>
+              <a:t>2/25/21</a:t>
             </a:fld>
             <a:endParaRPr lang="en-US"/>
           </a:p>
@@ -1545,7 +1547,7 @@
           <a:p>
             <a:fld id="{2691D6E4-0F7A-0249-86EF-226720E50E4C}" type="datetimeFigureOut">
               <a:rPr lang="en-US" smtClean="0"/>
-              <a:t>2/24/20</a:t>
+              <a:t>2/25/21</a:t>
             </a:fld>
             <a:endParaRPr lang="en-US"/>
           </a:p>
@@ -1854,7 +1856,7 @@
           <a:p>
             <a:fld id="{2691D6E4-0F7A-0249-86EF-226720E50E4C}" type="datetimeFigureOut">
               <a:rPr lang="en-US" smtClean="0"/>
-              <a:t>2/24/20</a:t>
+              <a:t>2/25/21</a:t>
             </a:fld>
             <a:endParaRPr lang="en-US"/>
           </a:p>
@@ -2297,7 +2299,7 @@
           <a:p>
             <a:fld id="{2691D6E4-0F7A-0249-86EF-226720E50E4C}" type="datetimeFigureOut">
               <a:rPr lang="en-US" smtClean="0"/>
-              <a:t>2/24/20</a:t>
+              <a:t>2/25/21</a:t>
             </a:fld>
             <a:endParaRPr lang="en-US"/>
           </a:p>
@@ -2438,7 +2440,7 @@
           <a:p>
             <a:fld id="{2691D6E4-0F7A-0249-86EF-226720E50E4C}" type="datetimeFigureOut">
               <a:rPr lang="en-US" smtClean="0"/>
-              <a:t>2/24/20</a:t>
+              <a:t>2/25/21</a:t>
             </a:fld>
             <a:endParaRPr lang="en-US"/>
           </a:p>
@@ -2557,7 +2559,7 @@
           <a:p>
             <a:fld id="{2691D6E4-0F7A-0249-86EF-226720E50E4C}" type="datetimeFigureOut">
               <a:rPr lang="en-US" smtClean="0"/>
-              <a:t>2/24/20</a:t>
+              <a:t>2/25/21</a:t>
             </a:fld>
             <a:endParaRPr lang="en-US"/>
           </a:p>
@@ -2856,7 +2858,7 @@
           <a:p>
             <a:fld id="{2691D6E4-0F7A-0249-86EF-226720E50E4C}" type="datetimeFigureOut">
               <a:rPr lang="en-US" smtClean="0"/>
-              <a:t>2/24/20</a:t>
+              <a:t>2/25/21</a:t>
             </a:fld>
             <a:endParaRPr lang="en-US"/>
           </a:p>
@@ -3132,7 +3134,7 @@
           <a:p>
             <a:fld id="{2691D6E4-0F7A-0249-86EF-226720E50E4C}" type="datetimeFigureOut">
               <a:rPr lang="en-US" smtClean="0"/>
-              <a:t>2/24/20</a:t>
+              <a:t>2/25/21</a:t>
             </a:fld>
             <a:endParaRPr lang="en-US"/>
           </a:p>
@@ -3812,7 +3814,13 @@
       </p:sp>
       <p:pic>
         <p:nvPicPr>
-          <p:cNvPr id="4" name="Picture 3"/>
+          <p:cNvPr id="5" name="Picture 4">
+            <a:extLst>
+              <a:ext uri="{FF2B5EF4-FFF2-40B4-BE49-F238E27FC236}">
+                <a16:creationId xmlns:a16="http://schemas.microsoft.com/office/drawing/2014/main" id="{FFBAE78E-142B-874A-A6A4-92234C9790B8}"/>
+              </a:ext>
+            </a:extLst>
+          </p:cNvPr>
           <p:cNvPicPr>
             <a:picLocks noChangeAspect="1"/>
           </p:cNvPicPr>
@@ -3826,8 +3834,8 @@
         </p:blipFill>
         <p:spPr>
           <a:xfrm>
-            <a:off x="63405" y="0"/>
-            <a:ext cx="9017190" cy="6858000"/>
+            <a:off x="0" y="152830"/>
+            <a:ext cx="9144000" cy="6552339"/>
           </a:xfrm>
           <a:prstGeom prst="rect">
             <a:avLst/>
@@ -3837,7 +3845,7 @@
     </p:spTree>
     <p:extLst>
       <p:ext uri="{BB962C8B-B14F-4D97-AF65-F5344CB8AC3E}">
-        <p14:creationId xmlns:p14="http://schemas.microsoft.com/office/powerpoint/2010/main" val="1930423961"/>
+        <p14:creationId xmlns:p14="http://schemas.microsoft.com/office/powerpoint/2010/main" val="2127233316"/>
       </p:ext>
     </p:extLst>
   </p:cSld>
@@ -3881,7 +3889,7 @@
           <a:p>
             <a:r>
               <a:rPr lang="en-US" dirty="0"/>
-              <a:t>How does it work?</a:t>
+              <a:t>Why do I want it?</a:t>
             </a:r>
           </a:p>
         </p:txBody>
@@ -3915,39 +3923,49 @@
               <a:rPr lang="is-IS" dirty="0">
                 <a:latin typeface="Calibri" charset="0"/>
               </a:rPr>
-              <a:t>You make some commits that form a coherent body of work, e.g. </a:t>
-            </a:r>
-            <a:r>
-              <a:rPr lang="en-US" dirty="0" err="1">
-                <a:latin typeface="Calibri" charset="0"/>
-              </a:rPr>
-              <a:t>i</a:t>
-            </a:r>
+              <a:t>Bugs are identified earlier during development</a:t>
+            </a:r>
+          </a:p>
+          <a:p>
+            <a:pPr lvl="1">
+              <a:spcBef>
+                <a:spcPts val="800"/>
+              </a:spcBef>
+              <a:buFont typeface="Arial" charset="0"/>
+              <a:buChar char="•"/>
+              <a:defRPr/>
+            </a:pPr>
             <a:r>
               <a:rPr lang="is-IS" dirty="0">
                 <a:latin typeface="Calibri" charset="0"/>
               </a:rPr>
-              <a:t>mplement a feature</a:t>
-            </a:r>
-          </a:p>
-          <a:p>
-            <a:pPr>
-              <a:spcBef>
-                <a:spcPts val="800"/>
-              </a:spcBef>
-              <a:buFont typeface="Arial" charset="0"/>
-              <a:buChar char="•"/>
-              <a:defRPr/>
-            </a:pPr>
+              <a:t>When a defect is identified after delivery the cost is enourmous, e.g. </a:t>
+            </a:r>
+          </a:p>
+          <a:p>
+            <a:pPr lvl="2">
+              <a:spcBef>
+                <a:spcPts val="800"/>
+              </a:spcBef>
+              <a:buFont typeface="Arial" charset="0"/>
+              <a:buChar char="•"/>
+              <a:defRPr/>
+            </a:pPr>
+            <a:r>
+              <a:rPr lang="en-US" dirty="0">
+                <a:latin typeface="Calibri" charset="0"/>
+              </a:rPr>
+              <a:t>B</a:t>
+            </a:r>
             <a:r>
               <a:rPr lang="is-IS" dirty="0">
                 <a:latin typeface="Calibri" charset="0"/>
               </a:rPr>
-              <a:t>You push to GitHub</a:t>
-            </a:r>
-          </a:p>
-          <a:p>
-            <a:pPr>
+              <a:t>ug tracking, testing, re-testing, release notes, customer notification, down time</a:t>
+            </a:r>
+          </a:p>
+          <a:p>
+            <a:pPr lvl="2">
               <a:spcBef>
                 <a:spcPts val="800"/>
               </a:spcBef>
@@ -3959,31 +3977,49 @@
               <a:rPr lang="is-IS" dirty="0">
                 <a:latin typeface="Calibri" charset="0"/>
               </a:rPr>
-              <a:t>A GitHub hook spins up a new virtual instance using Travis CI and configures it according to your needs</a:t>
-            </a:r>
-          </a:p>
-          <a:p>
-            <a:pPr>
-              <a:spcBef>
-                <a:spcPts val="800"/>
-              </a:spcBef>
-              <a:buFont typeface="Arial" charset="0"/>
-              <a:buChar char="•"/>
-              <a:defRPr/>
-            </a:pPr>
-            <a:r>
-              <a:rPr lang="is-IS" dirty="0">
-                <a:latin typeface="Calibri" charset="0"/>
+              <a:t>Damage to reputation or liability</a:t>
+            </a:r>
+          </a:p>
+        </p:txBody>
+      </p:sp>
+      <p:sp>
+        <p:nvSpPr>
+          <p:cNvPr id="4" name="Rectangle 3"/>
+          <p:cNvSpPr/>
+          <p:nvPr/>
+        </p:nvSpPr>
+        <p:spPr>
+          <a:xfrm>
+            <a:off x="1257300" y="5366435"/>
+            <a:ext cx="6845300" cy="646331"/>
+          </a:xfrm>
+          <a:prstGeom prst="rect">
+            <a:avLst/>
+          </a:prstGeom>
+        </p:spPr>
+        <p:txBody>
+          <a:bodyPr wrap="square">
+            <a:spAutoFit/>
+          </a:bodyPr>
+          <a:lstStyle/>
+          <a:p>
+            <a:r>
+              <a:rPr lang="en-US" dirty="0">
+                <a:hlinkClick r:id="rId2"/>
               </a:rPr>
-              <a:t>Travis CI runs the commands you specify that do unit testing, coverage reports and style checks</a:t>
-            </a:r>
+              <a:t>https://spectrum.ieee.org/computing/software/why-software-fails</a:t>
+            </a:r>
+            <a:endParaRPr lang="en-US" dirty="0"/>
+          </a:p>
+          <a:p>
+            <a:endParaRPr lang="en-US" dirty="0"/>
           </a:p>
         </p:txBody>
       </p:sp>
     </p:spTree>
     <p:extLst>
       <p:ext uri="{BB962C8B-B14F-4D97-AF65-F5344CB8AC3E}">
-        <p14:creationId xmlns:p14="http://schemas.microsoft.com/office/powerpoint/2010/main" val="1034692897"/>
+        <p14:creationId xmlns:p14="http://schemas.microsoft.com/office/powerpoint/2010/main" val="1754436551"/>
       </p:ext>
     </p:extLst>
   </p:cSld>
@@ -4058,6 +4094,247 @@
               <a:defRPr/>
             </a:pPr>
             <a:r>
+              <a:rPr lang="is-IS" dirty="0">
+                <a:latin typeface="Calibri" charset="0"/>
+              </a:rPr>
+              <a:t>You </a:t>
+            </a:r>
+            <a:r>
+              <a:rPr lang="en-US" dirty="0">
+                <a:latin typeface="Calibri" charset="0"/>
+              </a:rPr>
+              <a:t>have a public repository</a:t>
+            </a:r>
+            <a:endParaRPr lang="is-IS" dirty="0">
+              <a:latin typeface="Calibri" charset="0"/>
+            </a:endParaRPr>
+          </a:p>
+        </p:txBody>
+      </p:sp>
+    </p:spTree>
+    <p:extLst>
+      <p:ext uri="{BB962C8B-B14F-4D97-AF65-F5344CB8AC3E}">
+        <p14:creationId xmlns:p14="http://schemas.microsoft.com/office/powerpoint/2010/main" val="649008514"/>
+      </p:ext>
+    </p:extLst>
+  </p:cSld>
+  <p:clrMapOvr>
+    <a:masterClrMapping/>
+  </p:clrMapOvr>
+</p:sld>
+</file>
+
+<file path=ppt/slides/slide12.xml><?xml version="1.0" encoding="utf-8"?>
+<p:sld xmlns:a="http://schemas.openxmlformats.org/drawingml/2006/main" xmlns:r="http://schemas.openxmlformats.org/officeDocument/2006/relationships" xmlns:p="http://schemas.openxmlformats.org/presentationml/2006/main">
+  <p:cSld>
+    <p:spTree>
+      <p:nvGrpSpPr>
+        <p:cNvPr id="1" name=""/>
+        <p:cNvGrpSpPr/>
+        <p:nvPr/>
+      </p:nvGrpSpPr>
+      <p:grpSpPr>
+        <a:xfrm>
+          <a:off x="0" y="0"/>
+          <a:ext cx="0" cy="0"/>
+          <a:chOff x="0" y="0"/>
+          <a:chExt cx="0" cy="0"/>
+        </a:xfrm>
+      </p:grpSpPr>
+      <p:sp>
+        <p:nvSpPr>
+          <p:cNvPr id="2" name="Title 1"/>
+          <p:cNvSpPr>
+            <a:spLocks noGrp="1"/>
+          </p:cNvSpPr>
+          <p:nvPr>
+            <p:ph type="title"/>
+          </p:nvPr>
+        </p:nvSpPr>
+        <p:spPr/>
+        <p:txBody>
+          <a:bodyPr/>
+          <a:lstStyle/>
+          <a:p>
+            <a:r>
+              <a:rPr lang="en-US" dirty="0"/>
+              <a:t>How does it work?</a:t>
+            </a:r>
+          </a:p>
+        </p:txBody>
+      </p:sp>
+      <p:sp>
+        <p:nvSpPr>
+          <p:cNvPr id="3" name="Content Placeholder 2"/>
+          <p:cNvSpPr>
+            <a:spLocks noGrp="1"/>
+          </p:cNvSpPr>
+          <p:nvPr>
+            <p:ph idx="1"/>
+          </p:nvPr>
+        </p:nvSpPr>
+        <p:spPr/>
+        <p:txBody>
+          <a:bodyPr>
+            <a:normAutofit/>
+          </a:bodyPr>
+          <a:lstStyle/>
+          <a:p>
+            <a:pPr>
+              <a:spcBef>
+                <a:spcPts val="800"/>
+              </a:spcBef>
+              <a:buFont typeface="Arial" charset="0"/>
+              <a:buChar char="•"/>
+              <a:defRPr/>
+            </a:pPr>
+            <a:r>
+              <a:rPr lang="is-IS" dirty="0">
+                <a:latin typeface="Calibri" charset="0"/>
+              </a:rPr>
+              <a:t>You make some commits that form a coherent body of work, e.g. </a:t>
+            </a:r>
+            <a:r>
+              <a:rPr lang="en-US" dirty="0" err="1">
+                <a:latin typeface="Calibri" charset="0"/>
+              </a:rPr>
+              <a:t>i</a:t>
+            </a:r>
+            <a:r>
+              <a:rPr lang="is-IS" dirty="0">
+                <a:latin typeface="Calibri" charset="0"/>
+              </a:rPr>
+              <a:t>mplement a feature</a:t>
+            </a:r>
+          </a:p>
+          <a:p>
+            <a:pPr>
+              <a:spcBef>
+                <a:spcPts val="800"/>
+              </a:spcBef>
+              <a:buFont typeface="Arial" charset="0"/>
+              <a:buChar char="•"/>
+              <a:defRPr/>
+            </a:pPr>
+            <a:r>
+              <a:rPr lang="is-IS" dirty="0">
+                <a:latin typeface="Calibri" charset="0"/>
+              </a:rPr>
+              <a:t>You push to GitHub</a:t>
+            </a:r>
+          </a:p>
+          <a:p>
+            <a:pPr>
+              <a:spcBef>
+                <a:spcPts val="800"/>
+              </a:spcBef>
+              <a:buFont typeface="Arial" charset="0"/>
+              <a:buChar char="•"/>
+              <a:defRPr/>
+            </a:pPr>
+            <a:r>
+              <a:rPr lang="is-IS" dirty="0">
+                <a:latin typeface="Calibri" charset="0"/>
+              </a:rPr>
+              <a:t>A GitHub hook spins up a new virtual instance using Travis CI and configures it according to your needs</a:t>
+            </a:r>
+          </a:p>
+          <a:p>
+            <a:pPr>
+              <a:spcBef>
+                <a:spcPts val="800"/>
+              </a:spcBef>
+              <a:buFont typeface="Arial" charset="0"/>
+              <a:buChar char="•"/>
+              <a:defRPr/>
+            </a:pPr>
+            <a:r>
+              <a:rPr lang="is-IS" dirty="0">
+                <a:latin typeface="Calibri" charset="0"/>
+              </a:rPr>
+              <a:t>Travis CI runs the commands you specify that do unit testing, coverage reports and style checks</a:t>
+            </a:r>
+          </a:p>
+        </p:txBody>
+      </p:sp>
+    </p:spTree>
+    <p:extLst>
+      <p:ext uri="{BB962C8B-B14F-4D97-AF65-F5344CB8AC3E}">
+        <p14:creationId xmlns:p14="http://schemas.microsoft.com/office/powerpoint/2010/main" val="1034692897"/>
+      </p:ext>
+    </p:extLst>
+  </p:cSld>
+  <p:clrMapOvr>
+    <a:masterClrMapping/>
+  </p:clrMapOvr>
+</p:sld>
+</file>
+
+<file path=ppt/slides/slide13.xml><?xml version="1.0" encoding="utf-8"?>
+<p:sld xmlns:a="http://schemas.openxmlformats.org/drawingml/2006/main" xmlns:r="http://schemas.openxmlformats.org/officeDocument/2006/relationships" xmlns:p="http://schemas.openxmlformats.org/presentationml/2006/main">
+  <p:cSld>
+    <p:spTree>
+      <p:nvGrpSpPr>
+        <p:cNvPr id="1" name=""/>
+        <p:cNvGrpSpPr/>
+        <p:nvPr/>
+      </p:nvGrpSpPr>
+      <p:grpSpPr>
+        <a:xfrm>
+          <a:off x="0" y="0"/>
+          <a:ext cx="0" cy="0"/>
+          <a:chOff x="0" y="0"/>
+          <a:chExt cx="0" cy="0"/>
+        </a:xfrm>
+      </p:grpSpPr>
+      <p:sp>
+        <p:nvSpPr>
+          <p:cNvPr id="2" name="Title 1"/>
+          <p:cNvSpPr>
+            <a:spLocks noGrp="1"/>
+          </p:cNvSpPr>
+          <p:nvPr>
+            <p:ph type="title"/>
+          </p:nvPr>
+        </p:nvSpPr>
+        <p:spPr/>
+        <p:txBody>
+          <a:bodyPr/>
+          <a:lstStyle/>
+          <a:p>
+            <a:r>
+              <a:rPr lang="en-US" dirty="0"/>
+              <a:t>How does it work?</a:t>
+            </a:r>
+          </a:p>
+        </p:txBody>
+      </p:sp>
+      <p:sp>
+        <p:nvSpPr>
+          <p:cNvPr id="3" name="Content Placeholder 2"/>
+          <p:cNvSpPr>
+            <a:spLocks noGrp="1"/>
+          </p:cNvSpPr>
+          <p:nvPr>
+            <p:ph idx="1"/>
+          </p:nvPr>
+        </p:nvSpPr>
+        <p:spPr/>
+        <p:txBody>
+          <a:bodyPr>
+            <a:normAutofit/>
+          </a:bodyPr>
+          <a:lstStyle/>
+          <a:p>
+            <a:pPr>
+              <a:spcBef>
+                <a:spcPts val="800"/>
+              </a:spcBef>
+              <a:buFont typeface="Arial" charset="0"/>
+              <a:buChar char="•"/>
+              <a:defRPr/>
+            </a:pPr>
+            <a:r>
               <a:rPr lang="en-US" dirty="0">
                 <a:latin typeface="Calibri" charset="0"/>
               </a:rPr>
@@ -4126,7 +4403,7 @@
 </p:sld>
 </file>
 
-<file path=ppt/slides/slide12.xml><?xml version="1.0" encoding="utf-8"?>
+<file path=ppt/slides/slide14.xml><?xml version="1.0" encoding="utf-8"?>
 <p:sld xmlns:a="http://schemas.openxmlformats.org/drawingml/2006/main" xmlns:r="http://schemas.openxmlformats.org/officeDocument/2006/relationships" xmlns:p="http://schemas.openxmlformats.org/presentationml/2006/main">
   <p:cSld>
     <p:spTree>
@@ -4415,10 +4692,34 @@
           </a:p>
         </p:txBody>
       </p:sp>
+      <p:pic>
+        <p:nvPicPr>
+          <p:cNvPr id="4" name="Picture 3"/>
+          <p:cNvPicPr>
+            <a:picLocks noChangeAspect="1"/>
+          </p:cNvPicPr>
+          <p:nvPr/>
+        </p:nvPicPr>
+        <p:blipFill>
+          <a:blip r:embed="rId2"/>
+          <a:stretch>
+            <a:fillRect/>
+          </a:stretch>
+        </p:blipFill>
+        <p:spPr>
+          <a:xfrm>
+            <a:off x="63405" y="0"/>
+            <a:ext cx="9017190" cy="6858000"/>
+          </a:xfrm>
+          <a:prstGeom prst="rect">
+            <a:avLst/>
+          </a:prstGeom>
+        </p:spPr>
+      </p:pic>
     </p:spTree>
     <p:extLst>
       <p:ext uri="{BB962C8B-B14F-4D97-AF65-F5344CB8AC3E}">
-        <p14:creationId xmlns:p14="http://schemas.microsoft.com/office/powerpoint/2010/main" val="1369241035"/>
+        <p14:creationId xmlns:p14="http://schemas.microsoft.com/office/powerpoint/2010/main" val="1930423961"/>
       </p:ext>
     </p:extLst>
   </p:cSld>
@@ -4462,7 +4763,7 @@
           <a:p>
             <a:r>
               <a:rPr lang="en-US" dirty="0"/>
-              <a:t>What is it?</a:t>
+              <a:t>Agenda</a:t>
             </a:r>
           </a:p>
         </p:txBody>
@@ -4493,137 +4794,50 @@
               <a:defRPr/>
             </a:pPr>
             <a:r>
+              <a:rPr lang="en-US" dirty="0">
+                <a:latin typeface="Calibri" charset="0"/>
+              </a:rPr>
+              <a:t>What is continuous integration?</a:t>
+            </a:r>
+          </a:p>
+          <a:p>
+            <a:pPr>
+              <a:spcBef>
+                <a:spcPts val="800"/>
+              </a:spcBef>
+              <a:buFont typeface="Arial" charset="0"/>
+              <a:buChar char="•"/>
+              <a:defRPr/>
+            </a:pPr>
+            <a:r>
+              <a:rPr lang="en-US" dirty="0">
+                <a:latin typeface="Calibri" charset="0"/>
+              </a:rPr>
+              <a:t>Why do I want continuous integration?</a:t>
+            </a:r>
+          </a:p>
+          <a:p>
+            <a:pPr>
+              <a:spcBef>
+                <a:spcPts val="800"/>
+              </a:spcBef>
+              <a:buFont typeface="Arial" charset="0"/>
+              <a:buChar char="•"/>
+              <a:defRPr/>
+            </a:pPr>
+            <a:r>
               <a:rPr lang="is-IS" dirty="0">
                 <a:latin typeface="Calibri" charset="0"/>
               </a:rPr>
-              <a:t>Continuous Integration (CI)</a:t>
-            </a:r>
-          </a:p>
-          <a:p>
-            <a:pPr>
-              <a:spcBef>
-                <a:spcPts val="800"/>
-              </a:spcBef>
-              <a:buFont typeface="Arial" charset="0"/>
-              <a:buChar char="•"/>
-              <a:defRPr/>
-            </a:pPr>
-            <a:endParaRPr lang="is-IS" dirty="0">
-              <a:latin typeface="Calibri" charset="0"/>
-            </a:endParaRPr>
-          </a:p>
-          <a:p>
-            <a:pPr>
-              <a:spcBef>
-                <a:spcPts val="800"/>
-              </a:spcBef>
-              <a:buFont typeface="Arial" charset="0"/>
-              <a:buChar char="•"/>
-              <a:defRPr/>
-            </a:pPr>
-            <a:r>
-              <a:rPr lang="is-IS" dirty="0">
-                <a:latin typeface="Calibri" charset="0"/>
-              </a:rPr>
-              <a:t>Automated building and testing of a code base</a:t>
-            </a:r>
-          </a:p>
-          <a:p>
-            <a:pPr>
-              <a:spcBef>
-                <a:spcPts val="800"/>
-              </a:spcBef>
-              <a:buFont typeface="Arial" charset="0"/>
-              <a:buChar char="•"/>
-              <a:defRPr/>
-            </a:pPr>
-            <a:endParaRPr lang="is-IS" dirty="0">
-              <a:latin typeface="Calibri" charset="0"/>
-            </a:endParaRPr>
-          </a:p>
-          <a:p>
-            <a:pPr>
-              <a:spcBef>
-                <a:spcPts val="800"/>
-              </a:spcBef>
-              <a:buFont typeface="Arial" charset="0"/>
-              <a:buChar char="•"/>
-              <a:defRPr/>
-            </a:pPr>
-            <a:r>
-              <a:rPr lang="is-IS" dirty="0">
-                <a:latin typeface="Calibri" charset="0"/>
-              </a:rPr>
-              <a:t>Continuous</a:t>
-            </a:r>
-          </a:p>
-          <a:p>
-            <a:pPr lvl="1">
-              <a:spcBef>
-                <a:spcPts val="800"/>
-              </a:spcBef>
-              <a:buFont typeface="Arial" charset="0"/>
-              <a:buChar char="•"/>
-              <a:defRPr/>
-            </a:pPr>
-            <a:r>
-              <a:rPr lang="is-IS" dirty="0">
-                <a:latin typeface="Calibri" charset="0"/>
-              </a:rPr>
-              <a:t>Building and testing is done “continuously” as the code is developed</a:t>
-            </a:r>
-          </a:p>
-          <a:p>
-            <a:pPr>
-              <a:spcBef>
-                <a:spcPts val="800"/>
-              </a:spcBef>
-              <a:buFont typeface="Arial" charset="0"/>
-              <a:buChar char="•"/>
-              <a:defRPr/>
-            </a:pPr>
-            <a:r>
-              <a:rPr lang="is-IS" dirty="0">
-                <a:latin typeface="Calibri" charset="0"/>
-              </a:rPr>
-              <a:t>Integration</a:t>
-            </a:r>
-          </a:p>
-          <a:p>
-            <a:pPr lvl="1">
-              <a:spcBef>
-                <a:spcPts val="800"/>
-              </a:spcBef>
-              <a:buFont typeface="Arial" charset="0"/>
-              <a:buChar char="•"/>
-              <a:defRPr/>
-            </a:pPr>
-            <a:r>
-              <a:rPr lang="is-IS" dirty="0">
-                <a:latin typeface="Calibri" charset="0"/>
-              </a:rPr>
-              <a:t>“Integrating” changes from developers into code</a:t>
-            </a:r>
-          </a:p>
-          <a:p>
-            <a:pPr lvl="1">
-              <a:spcBef>
-                <a:spcPts val="800"/>
-              </a:spcBef>
-              <a:buFont typeface="Arial" charset="0"/>
-              <a:buChar char="•"/>
-              <a:defRPr/>
-            </a:pPr>
-            <a:endParaRPr lang="is-IS" dirty="0">
-              <a:latin typeface="Calibri" charset="0"/>
-            </a:endParaRPr>
+              <a:t>How can I use continuous integration?</a:t>
+            </a:r>
           </a:p>
         </p:txBody>
       </p:sp>
     </p:spTree>
     <p:extLst>
       <p:ext uri="{BB962C8B-B14F-4D97-AF65-F5344CB8AC3E}">
-        <p14:creationId xmlns:p14="http://schemas.microsoft.com/office/powerpoint/2010/main" val="582618578"/>
+        <p14:creationId xmlns:p14="http://schemas.microsoft.com/office/powerpoint/2010/main" val="1369241035"/>
       </p:ext>
     </p:extLst>
   </p:cSld>
@@ -4701,11 +4915,24 @@
               <a:rPr lang="is-IS" dirty="0">
                 <a:latin typeface="Calibri" charset="0"/>
               </a:rPr>
-              <a:t>Semi-continuous</a:t>
-            </a:r>
-          </a:p>
-          <a:p>
-            <a:pPr lvl="1">
+              <a:t>Continuous Integration (CI)</a:t>
+            </a:r>
+          </a:p>
+          <a:p>
+            <a:pPr>
+              <a:spcBef>
+                <a:spcPts val="800"/>
+              </a:spcBef>
+              <a:buFont typeface="Arial" charset="0"/>
+              <a:buChar char="•"/>
+              <a:defRPr/>
+            </a:pPr>
+            <a:endParaRPr lang="is-IS" dirty="0">
+              <a:latin typeface="Calibri" charset="0"/>
+            </a:endParaRPr>
+          </a:p>
+          <a:p>
+            <a:pPr>
               <a:spcBef>
                 <a:spcPts val="800"/>
               </a:spcBef>
@@ -4717,11 +4944,11 @@
               <a:rPr lang="is-IS" dirty="0">
                 <a:latin typeface="Calibri" charset="0"/>
               </a:rPr>
-              <a:t>The build and test process typically happens after a push</a:t>
-            </a:r>
-          </a:p>
-          <a:p>
-            <a:pPr lvl="1">
+              <a:t>Automated building and testing of a code base</a:t>
+            </a:r>
+          </a:p>
+          <a:p>
+            <a:pPr>
               <a:spcBef>
                 <a:spcPts val="800"/>
               </a:spcBef>
@@ -4746,11 +4973,11 @@
               <a:rPr lang="is-IS" dirty="0">
                 <a:latin typeface="Calibri" charset="0"/>
               </a:rPr>
-              <a:t>Testing is not necessarily part of CI but nearly all teams integrate the two</a:t>
-            </a:r>
-          </a:p>
-          <a:p>
-            <a:pPr>
+              <a:t>Continuous</a:t>
+            </a:r>
+          </a:p>
+          <a:p>
+            <a:pPr lvl="1">
               <a:spcBef>
                 <a:spcPts val="800"/>
               </a:spcBef>
@@ -4762,11 +4989,11 @@
               <a:rPr lang="is-IS" dirty="0">
                 <a:latin typeface="Calibri" charset="0"/>
               </a:rPr>
-              <a:t>Any code checks can be done as part of CI</a:t>
-            </a:r>
-          </a:p>
-          <a:p>
-            <a:pPr lvl="1">
+              <a:t>Building and testing is done “continuously” as the code is developed</a:t>
+            </a:r>
+          </a:p>
+          <a:p>
+            <a:pPr>
               <a:spcBef>
                 <a:spcPts val="800"/>
               </a:spcBef>
@@ -4778,7 +5005,7 @@
               <a:rPr lang="is-IS" dirty="0">
                 <a:latin typeface="Calibri" charset="0"/>
               </a:rPr>
-              <a:t>Code style checkers (flake8)</a:t>
+              <a:t>Integration</a:t>
             </a:r>
           </a:p>
           <a:p>
@@ -4794,7 +5021,7 @@
               <a:rPr lang="is-IS" dirty="0">
                 <a:latin typeface="Calibri" charset="0"/>
               </a:rPr>
-              <a:t>Linters (pylint)</a:t>
+              <a:t>“Integrating” changes from developers into code</a:t>
             </a:r>
           </a:p>
           <a:p>
@@ -4815,7 +5042,7 @@
     </p:spTree>
     <p:extLst>
       <p:ext uri="{BB962C8B-B14F-4D97-AF65-F5344CB8AC3E}">
-        <p14:creationId xmlns:p14="http://schemas.microsoft.com/office/powerpoint/2010/main" val="1426050527"/>
+        <p14:creationId xmlns:p14="http://schemas.microsoft.com/office/powerpoint/2010/main" val="582618578"/>
       </p:ext>
     </p:extLst>
   </p:cSld>
@@ -4859,13 +5086,8 @@
           <a:p>
             <a:r>
               <a:rPr lang="en-US" dirty="0"/>
-              <a:t>Related concepts</a:t>
-            </a:r>
-            <a:r>
-              <a:rPr lang="mr-IN" dirty="0"/>
-              <a:t>…</a:t>
-            </a:r>
-            <a:endParaRPr lang="en-US" dirty="0"/>
+              <a:t>What is it?</a:t>
+            </a:r>
           </a:p>
         </p:txBody>
       </p:sp>
@@ -4898,7 +5120,7 @@
               <a:rPr lang="is-IS" dirty="0">
                 <a:latin typeface="Calibri" charset="0"/>
               </a:rPr>
-              <a:t>Continuous Delivery</a:t>
+              <a:t>Semi-continuous</a:t>
             </a:r>
           </a:p>
           <a:p>
@@ -4914,11 +5136,24 @@
               <a:rPr lang="is-IS" dirty="0">
                 <a:latin typeface="Calibri" charset="0"/>
               </a:rPr>
-              <a:t>Practices that keep a master line of development ready for immediate deployment</a:t>
+              <a:t>The build and test process typically happens after a push</a:t>
             </a:r>
           </a:p>
           <a:p>
             <a:pPr lvl="1">
+              <a:spcBef>
+                <a:spcPts val="800"/>
+              </a:spcBef>
+              <a:buFont typeface="Arial" charset="0"/>
+              <a:buChar char="•"/>
+              <a:defRPr/>
+            </a:pPr>
+            <a:endParaRPr lang="is-IS" dirty="0">
+              <a:latin typeface="Calibri" charset="0"/>
+            </a:endParaRPr>
+          </a:p>
+          <a:p>
+            <a:pPr>
               <a:spcBef>
                 <a:spcPts val="800"/>
               </a:spcBef>
@@ -4930,11 +5165,11 @@
               <a:rPr lang="is-IS" dirty="0">
                 <a:latin typeface="Calibri" charset="0"/>
               </a:rPr>
-              <a:t>Ensuring code passes automated build/testing</a:t>
-            </a:r>
-          </a:p>
-          <a:p>
-            <a:pPr lvl="1">
+              <a:t>Testing is not necessarily part of CI but nearly all teams integrate the two</a:t>
+            </a:r>
+          </a:p>
+          <a:p>
+            <a:pPr>
               <a:spcBef>
                 <a:spcPts val="800"/>
               </a:spcBef>
@@ -4946,11 +5181,11 @@
               <a:rPr lang="is-IS" dirty="0">
                 <a:latin typeface="Calibri" charset="0"/>
               </a:rPr>
-              <a:t>All configuration information and data is ready</a:t>
-            </a:r>
-          </a:p>
-          <a:p>
-            <a:pPr>
+              <a:t>Any code checks can be done as part of CI</a:t>
+            </a:r>
+          </a:p>
+          <a:p>
+            <a:pPr lvl="1">
               <a:spcBef>
                 <a:spcPts val="800"/>
               </a:spcBef>
@@ -4962,7 +5197,7 @@
               <a:rPr lang="is-IS" dirty="0">
                 <a:latin typeface="Calibri" charset="0"/>
               </a:rPr>
-              <a:t>Continuous Deployment</a:t>
+              <a:t>Code style checkers (flake8)</a:t>
             </a:r>
           </a:p>
           <a:p>
@@ -4978,23 +5213,7 @@
               <a:rPr lang="is-IS" dirty="0">
                 <a:latin typeface="Calibri" charset="0"/>
               </a:rPr>
-              <a:t>Automated continuous delivery</a:t>
-            </a:r>
-          </a:p>
-          <a:p>
-            <a:pPr lvl="1">
-              <a:spcBef>
-                <a:spcPts val="800"/>
-              </a:spcBef>
-              <a:buFont typeface="Arial" charset="0"/>
-              <a:buChar char="•"/>
-              <a:defRPr/>
-            </a:pPr>
-            <a:r>
-              <a:rPr lang="is-IS" dirty="0">
-                <a:latin typeface="Calibri" charset="0"/>
-              </a:rPr>
-              <a:t>As soon as all the continuous delivery constraints are met, the application is automatically deployed</a:t>
+              <a:t>Linters (pylint)</a:t>
             </a:r>
           </a:p>
           <a:p>
@@ -5010,38 +5229,12 @@
               <a:latin typeface="Calibri" charset="0"/>
             </a:endParaRPr>
           </a:p>
-          <a:p>
-            <a:pPr lvl="1">
-              <a:spcBef>
-                <a:spcPts val="800"/>
-              </a:spcBef>
-              <a:buFont typeface="Arial" charset="0"/>
-              <a:buChar char="•"/>
-              <a:defRPr/>
-            </a:pPr>
-            <a:endParaRPr lang="is-IS" dirty="0">
-              <a:latin typeface="Calibri" charset="0"/>
-            </a:endParaRPr>
-          </a:p>
-          <a:p>
-            <a:pPr>
-              <a:spcBef>
-                <a:spcPts val="800"/>
-              </a:spcBef>
-              <a:buFont typeface="Arial" charset="0"/>
-              <a:buChar char="•"/>
-              <a:defRPr/>
-            </a:pPr>
-            <a:endParaRPr lang="is-IS" dirty="0">
-              <a:latin typeface="Calibri" charset="0"/>
-            </a:endParaRPr>
-          </a:p>
         </p:txBody>
       </p:sp>
     </p:spTree>
     <p:extLst>
       <p:ext uri="{BB962C8B-B14F-4D97-AF65-F5344CB8AC3E}">
-        <p14:creationId xmlns:p14="http://schemas.microsoft.com/office/powerpoint/2010/main" val="1635273792"/>
+        <p14:creationId xmlns:p14="http://schemas.microsoft.com/office/powerpoint/2010/main" val="1426050527"/>
       </p:ext>
     </p:extLst>
   </p:cSld>
@@ -5112,6 +5305,118 @@
           </a:bodyPr>
           <a:lstStyle/>
           <a:p>
+            <a:pPr>
+              <a:spcBef>
+                <a:spcPts val="800"/>
+              </a:spcBef>
+              <a:buFont typeface="Arial" charset="0"/>
+              <a:buChar char="•"/>
+              <a:defRPr/>
+            </a:pPr>
+            <a:r>
+              <a:rPr lang="is-IS" dirty="0">
+                <a:latin typeface="Calibri" charset="0"/>
+              </a:rPr>
+              <a:t>Continuous Delivery</a:t>
+            </a:r>
+          </a:p>
+          <a:p>
+            <a:pPr lvl="1">
+              <a:spcBef>
+                <a:spcPts val="800"/>
+              </a:spcBef>
+              <a:buFont typeface="Arial" charset="0"/>
+              <a:buChar char="•"/>
+              <a:defRPr/>
+            </a:pPr>
+            <a:r>
+              <a:rPr lang="is-IS" dirty="0">
+                <a:latin typeface="Calibri" charset="0"/>
+              </a:rPr>
+              <a:t>Practices that keep a master line of development ready for immediate deployment</a:t>
+            </a:r>
+          </a:p>
+          <a:p>
+            <a:pPr lvl="1">
+              <a:spcBef>
+                <a:spcPts val="800"/>
+              </a:spcBef>
+              <a:buFont typeface="Arial" charset="0"/>
+              <a:buChar char="•"/>
+              <a:defRPr/>
+            </a:pPr>
+            <a:r>
+              <a:rPr lang="is-IS" dirty="0">
+                <a:latin typeface="Calibri" charset="0"/>
+              </a:rPr>
+              <a:t>Ensuring code passes automated build/testing</a:t>
+            </a:r>
+          </a:p>
+          <a:p>
+            <a:pPr lvl="1">
+              <a:spcBef>
+                <a:spcPts val="800"/>
+              </a:spcBef>
+              <a:buFont typeface="Arial" charset="0"/>
+              <a:buChar char="•"/>
+              <a:defRPr/>
+            </a:pPr>
+            <a:r>
+              <a:rPr lang="is-IS" dirty="0">
+                <a:latin typeface="Calibri" charset="0"/>
+              </a:rPr>
+              <a:t>All configuration information and data is ready</a:t>
+            </a:r>
+          </a:p>
+          <a:p>
+            <a:pPr>
+              <a:spcBef>
+                <a:spcPts val="800"/>
+              </a:spcBef>
+              <a:buFont typeface="Arial" charset="0"/>
+              <a:buChar char="•"/>
+              <a:defRPr/>
+            </a:pPr>
+            <a:r>
+              <a:rPr lang="is-IS" dirty="0">
+                <a:latin typeface="Calibri" charset="0"/>
+              </a:rPr>
+              <a:t>Continuous Deployment</a:t>
+            </a:r>
+          </a:p>
+          <a:p>
+            <a:pPr lvl="1">
+              <a:spcBef>
+                <a:spcPts val="800"/>
+              </a:spcBef>
+              <a:buFont typeface="Arial" charset="0"/>
+              <a:buChar char="•"/>
+              <a:defRPr/>
+            </a:pPr>
+            <a:r>
+              <a:rPr lang="is-IS" dirty="0">
+                <a:latin typeface="Calibri" charset="0"/>
+              </a:rPr>
+              <a:t>Automated continuous delivery</a:t>
+            </a:r>
+          </a:p>
+          <a:p>
+            <a:pPr lvl="1">
+              <a:spcBef>
+                <a:spcPts val="800"/>
+              </a:spcBef>
+              <a:buFont typeface="Arial" charset="0"/>
+              <a:buChar char="•"/>
+              <a:defRPr/>
+            </a:pPr>
+            <a:r>
+              <a:rPr lang="is-IS" dirty="0">
+                <a:latin typeface="Calibri" charset="0"/>
+              </a:rPr>
+              <a:t>As soon as all the continuous delivery constraints are met, the application is automatically deployed</a:t>
+            </a:r>
+          </a:p>
+          <a:p>
             <a:pPr lvl="1">
               <a:spcBef>
                 <a:spcPts val="800"/>
@@ -5152,130 +5457,10 @@
           </a:p>
         </p:txBody>
       </p:sp>
-      <p:pic>
-        <p:nvPicPr>
-          <p:cNvPr id="4" name="Picture 3"/>
-          <p:cNvPicPr>
-            <a:picLocks noChangeAspect="1"/>
-          </p:cNvPicPr>
-          <p:nvPr/>
-        </p:nvPicPr>
-        <p:blipFill>
-          <a:blip r:embed="rId2"/>
-          <a:stretch>
-            <a:fillRect/>
-          </a:stretch>
-        </p:blipFill>
-        <p:spPr>
-          <a:xfrm>
-            <a:off x="762000" y="1600200"/>
-            <a:ext cx="7620000" cy="4572000"/>
-          </a:xfrm>
-          <a:prstGeom prst="rect">
-            <a:avLst/>
-          </a:prstGeom>
-        </p:spPr>
-      </p:pic>
-      <p:sp>
-        <p:nvSpPr>
-          <p:cNvPr id="5" name="Rectangle 4"/>
-          <p:cNvSpPr/>
-          <p:nvPr/>
-        </p:nvSpPr>
-        <p:spPr>
-          <a:xfrm>
-            <a:off x="165100" y="6530626"/>
-            <a:ext cx="7975600" cy="246221"/>
-          </a:xfrm>
-          <a:prstGeom prst="rect">
-            <a:avLst/>
-          </a:prstGeom>
-        </p:spPr>
-        <p:txBody>
-          <a:bodyPr wrap="square">
-            <a:spAutoFit/>
-          </a:bodyPr>
-          <a:lstStyle/>
-          <a:p>
-            <a:r>
-              <a:rPr lang="en-US" sz="1000" dirty="0"/>
-              <a:t>http://</a:t>
-            </a:r>
-            <a:r>
-              <a:rPr lang="en-US" sz="1000" dirty="0" err="1"/>
-              <a:t>blog.crisp.se</a:t>
-            </a:r>
-            <a:r>
-              <a:rPr lang="en-US" sz="1000" dirty="0"/>
-              <a:t>/2013/02/05/</a:t>
-            </a:r>
-            <a:r>
-              <a:rPr lang="en-US" sz="1000" dirty="0" err="1"/>
-              <a:t>yassalsundman</a:t>
-            </a:r>
-            <a:r>
-              <a:rPr lang="en-US" sz="1000" dirty="0"/>
-              <a:t>/continuous-delivery-vs-continuous-deployment</a:t>
-            </a:r>
-          </a:p>
-        </p:txBody>
-      </p:sp>
-      <p:sp>
-        <p:nvSpPr>
-          <p:cNvPr id="6" name="Rectangle 5"/>
-          <p:cNvSpPr/>
-          <p:nvPr/>
-        </p:nvSpPr>
-        <p:spPr>
-          <a:xfrm>
-            <a:off x="457200" y="5814622"/>
-            <a:ext cx="8229600" cy="646331"/>
-          </a:xfrm>
-          <a:prstGeom prst="rect">
-            <a:avLst/>
-          </a:prstGeom>
-        </p:spPr>
-        <p:txBody>
-          <a:bodyPr wrap="square">
-            <a:spAutoFit/>
-          </a:bodyPr>
-          <a:lstStyle/>
-          <a:p>
-            <a:r>
-              <a:rPr lang="en-US" dirty="0">
-                <a:solidFill>
-                  <a:srgbClr val="111111"/>
-                </a:solidFill>
-                <a:latin typeface="Helvetica" charset="0"/>
-              </a:rPr>
-              <a:t>“A rule of thumb in CD[</a:t>
-            </a:r>
-            <a:r>
-              <a:rPr lang="en-US" dirty="0" err="1">
-                <a:solidFill>
-                  <a:srgbClr val="111111"/>
-                </a:solidFill>
-                <a:latin typeface="Helvetica" charset="0"/>
-              </a:rPr>
-              <a:t>elivery</a:t>
-            </a:r>
-            <a:r>
-              <a:rPr lang="en-US" dirty="0">
-                <a:solidFill>
-                  <a:srgbClr val="111111"/>
-                </a:solidFill>
-                <a:latin typeface="Helvetica" charset="0"/>
-              </a:rPr>
-              <a:t>] is that every commit should be a release candidate but the release should be a political decision and done manually.”</a:t>
-            </a:r>
-            <a:endParaRPr lang="en-US" dirty="0"/>
-          </a:p>
-        </p:txBody>
-      </p:sp>
     </p:spTree>
     <p:extLst>
       <p:ext uri="{BB962C8B-B14F-4D97-AF65-F5344CB8AC3E}">
-        <p14:creationId xmlns:p14="http://schemas.microsoft.com/office/powerpoint/2010/main" val="1067150299"/>
+        <p14:creationId xmlns:p14="http://schemas.microsoft.com/office/powerpoint/2010/main" val="1635273792"/>
       </p:ext>
     </p:extLst>
   </p:cSld>
@@ -5319,8 +5504,13 @@
           <a:p>
             <a:r>
               <a:rPr lang="en-US" dirty="0"/>
-              <a:t>Why do I want it?</a:t>
-            </a:r>
+              <a:t>Related concepts</a:t>
+            </a:r>
+            <a:r>
+              <a:rPr lang="mr-IN" dirty="0"/>
+              <a:t>…</a:t>
+            </a:r>
+            <a:endParaRPr lang="en-US" dirty="0"/>
           </a:p>
         </p:txBody>
       </p:sp>
@@ -5341,86 +5531,6 @@
           </a:bodyPr>
           <a:lstStyle/>
           <a:p>
-            <a:pPr>
-              <a:spcBef>
-                <a:spcPts val="800"/>
-              </a:spcBef>
-              <a:buFont typeface="Arial" charset="0"/>
-              <a:buChar char="•"/>
-              <a:defRPr/>
-            </a:pPr>
-            <a:r>
-              <a:rPr lang="is-IS" dirty="0">
-                <a:latin typeface="Calibri" charset="0"/>
-              </a:rPr>
-              <a:t>CI automates building and testing</a:t>
-            </a:r>
-          </a:p>
-          <a:p>
-            <a:pPr>
-              <a:spcBef>
-                <a:spcPts val="800"/>
-              </a:spcBef>
-              <a:buFont typeface="Arial" charset="0"/>
-              <a:buChar char="•"/>
-              <a:defRPr/>
-            </a:pPr>
-            <a:r>
-              <a:rPr lang="is-IS" dirty="0">
-                <a:latin typeface="Calibri" charset="0"/>
-              </a:rPr>
-              <a:t>Provides rigourous quality checks on the master branch</a:t>
-            </a:r>
-          </a:p>
-          <a:p>
-            <a:pPr>
-              <a:spcBef>
-                <a:spcPts val="800"/>
-              </a:spcBef>
-              <a:buFont typeface="Arial" charset="0"/>
-              <a:buChar char="•"/>
-              <a:defRPr/>
-            </a:pPr>
-            <a:r>
-              <a:rPr lang="is-IS" dirty="0">
-                <a:latin typeface="Calibri" charset="0"/>
-              </a:rPr>
-              <a:t>Core component of Continuous Delivery and Deployment</a:t>
-            </a:r>
-          </a:p>
-          <a:p>
-            <a:pPr>
-              <a:spcBef>
-                <a:spcPts val="800"/>
-              </a:spcBef>
-              <a:buFont typeface="Arial" charset="0"/>
-              <a:buChar char="•"/>
-              <a:defRPr/>
-            </a:pPr>
-            <a:r>
-              <a:rPr lang="is-IS" dirty="0">
-                <a:latin typeface="Calibri" charset="0"/>
-              </a:rPr>
-              <a:t>Requires that a team performs more frequent “integrations”</a:t>
-            </a:r>
-          </a:p>
-          <a:p>
-            <a:pPr lvl="1">
-              <a:spcBef>
-                <a:spcPts val="800"/>
-              </a:spcBef>
-              <a:buFont typeface="Arial" charset="0"/>
-              <a:buChar char="•"/>
-              <a:defRPr/>
-            </a:pPr>
-            <a:r>
-              <a:rPr lang="is-IS" dirty="0">
-                <a:latin typeface="Calibri" charset="0"/>
-              </a:rPr>
-              <a:t>Evidence shows that `conflicts` are resolved more rapidly</a:t>
-            </a:r>
-          </a:p>
-          <a:p>
             <a:pPr lvl="1">
               <a:spcBef>
                 <a:spcPts val="800"/>
@@ -5433,12 +5543,158 @@
               <a:latin typeface="Calibri" charset="0"/>
             </a:endParaRPr>
           </a:p>
+          <a:p>
+            <a:pPr lvl="1">
+              <a:spcBef>
+                <a:spcPts val="800"/>
+              </a:spcBef>
+              <a:buFont typeface="Arial" charset="0"/>
+              <a:buChar char="•"/>
+              <a:defRPr/>
+            </a:pPr>
+            <a:endParaRPr lang="is-IS" dirty="0">
+              <a:latin typeface="Calibri" charset="0"/>
+            </a:endParaRPr>
+          </a:p>
+          <a:p>
+            <a:pPr>
+              <a:spcBef>
+                <a:spcPts val="800"/>
+              </a:spcBef>
+              <a:buFont typeface="Arial" charset="0"/>
+              <a:buChar char="•"/>
+              <a:defRPr/>
+            </a:pPr>
+            <a:endParaRPr lang="is-IS" dirty="0">
+              <a:latin typeface="Calibri" charset="0"/>
+            </a:endParaRPr>
+          </a:p>
+        </p:txBody>
+      </p:sp>
+      <p:pic>
+        <p:nvPicPr>
+          <p:cNvPr id="4" name="Picture 3"/>
+          <p:cNvPicPr>
+            <a:picLocks noChangeAspect="1"/>
+          </p:cNvPicPr>
+          <p:nvPr/>
+        </p:nvPicPr>
+        <p:blipFill>
+          <a:blip r:embed="rId2"/>
+          <a:stretch>
+            <a:fillRect/>
+          </a:stretch>
+        </p:blipFill>
+        <p:spPr>
+          <a:xfrm>
+            <a:off x="762000" y="1600200"/>
+            <a:ext cx="7620000" cy="4572000"/>
+          </a:xfrm>
+          <a:prstGeom prst="rect">
+            <a:avLst/>
+          </a:prstGeom>
+        </p:spPr>
+      </p:pic>
+      <p:sp>
+        <p:nvSpPr>
+          <p:cNvPr id="5" name="Rectangle 4"/>
+          <p:cNvSpPr/>
+          <p:nvPr/>
+        </p:nvSpPr>
+        <p:spPr>
+          <a:xfrm>
+            <a:off x="165100" y="6530626"/>
+            <a:ext cx="7975600" cy="246221"/>
+          </a:xfrm>
+          <a:prstGeom prst="rect">
+            <a:avLst/>
+          </a:prstGeom>
+        </p:spPr>
+        <p:txBody>
+          <a:bodyPr wrap="square">
+            <a:spAutoFit/>
+          </a:bodyPr>
+          <a:lstStyle/>
+          <a:p>
+            <a:r>
+              <a:rPr lang="en-US" sz="1000" dirty="0"/>
+              <a:t>http://</a:t>
+            </a:r>
+            <a:r>
+              <a:rPr lang="en-US" sz="1000" dirty="0" err="1"/>
+              <a:t>blog.crisp.se</a:t>
+            </a:r>
+            <a:r>
+              <a:rPr lang="en-US" sz="1000" dirty="0"/>
+              <a:t>/2013/02/05/</a:t>
+            </a:r>
+            <a:r>
+              <a:rPr lang="en-US" sz="1000" dirty="0" err="1"/>
+              <a:t>yassalsundman</a:t>
+            </a:r>
+            <a:r>
+              <a:rPr lang="en-US" sz="1000" dirty="0"/>
+              <a:t>/continuous-delivery-vs-continuous-deployment</a:t>
+            </a:r>
+          </a:p>
+        </p:txBody>
+      </p:sp>
+      <p:sp>
+        <p:nvSpPr>
+          <p:cNvPr id="6" name="Rectangle 5"/>
+          <p:cNvSpPr/>
+          <p:nvPr/>
+        </p:nvSpPr>
+        <p:spPr>
+          <a:xfrm>
+            <a:off x="457200" y="5814622"/>
+            <a:ext cx="8229600" cy="646331"/>
+          </a:xfrm>
+          <a:prstGeom prst="rect">
+            <a:avLst/>
+          </a:prstGeom>
+        </p:spPr>
+        <p:txBody>
+          <a:bodyPr wrap="square">
+            <a:spAutoFit/>
+          </a:bodyPr>
+          <a:lstStyle/>
+          <a:p>
+            <a:r>
+              <a:rPr lang="en-US" dirty="0">
+                <a:solidFill>
+                  <a:srgbClr val="111111"/>
+                </a:solidFill>
+                <a:latin typeface="Helvetica" charset="0"/>
+              </a:rPr>
+              <a:t>“A rule of thumb in CD[</a:t>
+            </a:r>
+            <a:r>
+              <a:rPr lang="en-US" dirty="0" err="1">
+                <a:solidFill>
+                  <a:srgbClr val="111111"/>
+                </a:solidFill>
+                <a:latin typeface="Helvetica" charset="0"/>
+              </a:rPr>
+              <a:t>elivery</a:t>
+            </a:r>
+            <a:r>
+              <a:rPr lang="en-US" dirty="0">
+                <a:solidFill>
+                  <a:srgbClr val="111111"/>
+                </a:solidFill>
+                <a:latin typeface="Helvetica" charset="0"/>
+              </a:rPr>
+              <a:t>] is that every commit should be a release candidate but the release should be a political decision and done manually.”</a:t>
+            </a:r>
+            <a:endParaRPr lang="en-US" dirty="0"/>
+          </a:p>
         </p:txBody>
       </p:sp>
     </p:spTree>
     <p:extLst>
       <p:ext uri="{BB962C8B-B14F-4D97-AF65-F5344CB8AC3E}">
-        <p14:creationId xmlns:p14="http://schemas.microsoft.com/office/powerpoint/2010/main" val="1690491059"/>
+        <p14:creationId xmlns:p14="http://schemas.microsoft.com/office/powerpoint/2010/main" val="1067150299"/>
       </p:ext>
     </p:extLst>
   </p:cSld>
@@ -5516,11 +5772,11 @@
               <a:rPr lang="is-IS" dirty="0">
                 <a:latin typeface="Calibri" charset="0"/>
               </a:rPr>
-              <a:t>Bugs are identified earlier during development</a:t>
-            </a:r>
-          </a:p>
-          <a:p>
-            <a:pPr lvl="1">
+              <a:t>CI automates building and testing</a:t>
+            </a:r>
+          </a:p>
+          <a:p>
+            <a:pPr>
               <a:spcBef>
                 <a:spcPts val="800"/>
               </a:spcBef>
@@ -5532,11 +5788,11 @@
               <a:rPr lang="is-IS" dirty="0">
                 <a:latin typeface="Calibri" charset="0"/>
               </a:rPr>
-              <a:t>Cost to fix bugs is exponentially related to when the bug is identified</a:t>
-            </a:r>
-          </a:p>
-          <a:p>
-            <a:pPr lvl="1">
+              <a:t>Provides rigourous quality checks on the master branch</a:t>
+            </a:r>
+          </a:p>
+          <a:p>
+            <a:pPr>
               <a:spcBef>
                 <a:spcPts val="800"/>
               </a:spcBef>
@@ -5548,11 +5804,11 @@
               <a:rPr lang="is-IS" dirty="0">
                 <a:latin typeface="Calibri" charset="0"/>
               </a:rPr>
-              <a:t>Easier to identify offending code when it was written shortly before a defect was identified</a:t>
-            </a:r>
-          </a:p>
-          <a:p>
-            <a:pPr lvl="2">
+              <a:t>Core component of Continuous Delivery and Deployment</a:t>
+            </a:r>
+          </a:p>
+          <a:p>
+            <a:pPr>
               <a:spcBef>
                 <a:spcPts val="800"/>
               </a:spcBef>
@@ -5564,7 +5820,7 @@
               <a:rPr lang="is-IS" dirty="0">
                 <a:latin typeface="Calibri" charset="0"/>
               </a:rPr>
-              <a:t>You just wrote the code, it is fresh in your mind</a:t>
+              <a:t>Requires that a team performs more frequent “integrations”</a:t>
             </a:r>
           </a:p>
           <a:p>
@@ -5580,7 +5836,7 @@
               <a:rPr lang="is-IS" dirty="0">
                 <a:latin typeface="Calibri" charset="0"/>
               </a:rPr>
-              <a:t>CI checks on small units of work benefit the most from this</a:t>
+              <a:t>Evidence shows that `conflicts` are resolved more rapidly</a:t>
             </a:r>
           </a:p>
           <a:p>
@@ -5592,19 +5848,16 @@
               <a:buChar char="•"/>
               <a:defRPr/>
             </a:pPr>
-            <a:r>
-              <a:rPr lang="is-IS" dirty="0">
-                <a:latin typeface="Calibri" charset="0"/>
-              </a:rPr>
-              <a:t>Some teams will run up to 50+ CI checks a day</a:t>
-            </a:r>
+            <a:endParaRPr lang="is-IS" dirty="0">
+              <a:latin typeface="Calibri" charset="0"/>
+            </a:endParaRPr>
           </a:p>
         </p:txBody>
       </p:sp>
     </p:spTree>
     <p:extLst>
       <p:ext uri="{BB962C8B-B14F-4D97-AF65-F5344CB8AC3E}">
-        <p14:creationId xmlns:p14="http://schemas.microsoft.com/office/powerpoint/2010/main" val="5389468"/>
+        <p14:creationId xmlns:p14="http://schemas.microsoft.com/office/powerpoint/2010/main" val="1690491059"/>
       </p:ext>
     </p:extLst>
   </p:cSld>
@@ -5698,29 +5951,23 @@
               <a:rPr lang="is-IS" dirty="0">
                 <a:latin typeface="Calibri" charset="0"/>
               </a:rPr>
-              <a:t>When a defect is identified after delivery the cost is enourmous, e.g. </a:t>
-            </a:r>
-          </a:p>
-          <a:p>
-            <a:pPr lvl="2">
-              <a:spcBef>
-                <a:spcPts val="800"/>
-              </a:spcBef>
-              <a:buFont typeface="Arial" charset="0"/>
-              <a:buChar char="•"/>
-              <a:defRPr/>
-            </a:pPr>
-            <a:r>
-              <a:rPr lang="en-US" dirty="0">
-                <a:latin typeface="Calibri" charset="0"/>
-              </a:rPr>
-              <a:t>B</a:t>
-            </a:r>
+              <a:t>Cost to fix bugs is exponentially related to when the bug is identified</a:t>
+            </a:r>
+          </a:p>
+          <a:p>
+            <a:pPr lvl="1">
+              <a:spcBef>
+                <a:spcPts val="800"/>
+              </a:spcBef>
+              <a:buFont typeface="Arial" charset="0"/>
+              <a:buChar char="•"/>
+              <a:defRPr/>
+            </a:pPr>
             <a:r>
               <a:rPr lang="is-IS" dirty="0">
                 <a:latin typeface="Calibri" charset="0"/>
               </a:rPr>
-              <a:t>ug tracking, testing, re-testing, release notes, customer notification, down time</a:t>
+              <a:t>Easier to identify offending code when it was written shortly before a defect was identified</a:t>
             </a:r>
           </a:p>
           <a:p>
@@ -5736,49 +5983,47 @@
               <a:rPr lang="is-IS" dirty="0">
                 <a:latin typeface="Calibri" charset="0"/>
               </a:rPr>
-              <a:t>Damage to reputation or liability</a:t>
-            </a:r>
-          </a:p>
-        </p:txBody>
-      </p:sp>
-      <p:sp>
-        <p:nvSpPr>
-          <p:cNvPr id="4" name="Rectangle 3"/>
-          <p:cNvSpPr/>
-          <p:nvPr/>
-        </p:nvSpPr>
-        <p:spPr>
-          <a:xfrm>
-            <a:off x="1257300" y="5366435"/>
-            <a:ext cx="6845300" cy="646331"/>
-          </a:xfrm>
-          <a:prstGeom prst="rect">
-            <a:avLst/>
-          </a:prstGeom>
-        </p:spPr>
-        <p:txBody>
-          <a:bodyPr wrap="square">
-            <a:spAutoFit/>
-          </a:bodyPr>
-          <a:lstStyle/>
-          <a:p>
-            <a:r>
-              <a:rPr lang="en-US" dirty="0">
-                <a:hlinkClick r:id="rId2"/>
+              <a:t>You just wrote the code, it is fresh in your mind</a:t>
+            </a:r>
+          </a:p>
+          <a:p>
+            <a:pPr lvl="1">
+              <a:spcBef>
+                <a:spcPts val="800"/>
+              </a:spcBef>
+              <a:buFont typeface="Arial" charset="0"/>
+              <a:buChar char="•"/>
+              <a:defRPr/>
+            </a:pPr>
+            <a:r>
+              <a:rPr lang="is-IS" dirty="0">
+                <a:latin typeface="Calibri" charset="0"/>
               </a:rPr>
-              <a:t>https://spectrum.ieee.org/computing/software/why-software-fails</a:t>
-            </a:r>
-            <a:endParaRPr lang="en-US" dirty="0"/>
-          </a:p>
-          <a:p>
-            <a:endParaRPr lang="en-US" dirty="0"/>
+              <a:t>CI checks on small units of work benefit the most from this</a:t>
+            </a:r>
+          </a:p>
+          <a:p>
+            <a:pPr lvl="1">
+              <a:spcBef>
+                <a:spcPts val="800"/>
+              </a:spcBef>
+              <a:buFont typeface="Arial" charset="0"/>
+              <a:buChar char="•"/>
+              <a:defRPr/>
+            </a:pPr>
+            <a:r>
+              <a:rPr lang="is-IS" dirty="0">
+                <a:latin typeface="Calibri" charset="0"/>
+              </a:rPr>
+              <a:t>Some teams will run up to 50+ CI checks a day</a:t>
+            </a:r>
           </a:p>
         </p:txBody>
       </p:sp>
     </p:spTree>
     <p:extLst>
       <p:ext uri="{BB962C8B-B14F-4D97-AF65-F5344CB8AC3E}">
-        <p14:creationId xmlns:p14="http://schemas.microsoft.com/office/powerpoint/2010/main" val="1754436551"/>
+        <p14:creationId xmlns:p14="http://schemas.microsoft.com/office/powerpoint/2010/main" val="5389468"/>
       </p:ext>
     </p:extLst>
   </p:cSld>

</xml_diff>